<commit_message>
updated questions for client
</commit_message>
<xml_diff>
--- a/Presentation/Questions.pptx
+++ b/Presentation/Questions.pptx
@@ -105,6 +105,11 @@
       </a:defRPr>
     </a:lvl9pPr>
   </p:defaultTextStyle>
+  <p:extLst>
+    <p:ext uri="{EFAFB233-063F-42B5-8137-9DF3F51BA10A}">
+      <p15:sldGuideLst xmlns:p15="http://schemas.microsoft.com/office/powerpoint/2012/main"/>
+    </p:ext>
+  </p:extLst>
 </p:presentation>
 </file>
 
@@ -3177,13 +3182,14 @@
             </a:r>
           </a:p>
           <a:p>
-            <a:pPr marL="514350" indent="-514350">
-              <a:buAutoNum type="arabicPeriod"/>
+            <a:pPr marL="0" indent="0">
+              <a:buNone/>
             </a:pPr>
             <a:r>
               <a:rPr lang="en-US" dirty="0" smtClean="0"/>
-              <a:t>Are you afraid of potential security threats?</a:t>
-            </a:r>
+              <a:t>9. Are you willing to pay?</a:t>
+            </a:r>
+            <a:endParaRPr lang="en-US" dirty="0" smtClean="0"/>
           </a:p>
           <a:p>
             <a:pPr marL="0" indent="0">

</xml_diff>